<commit_message>
change branch office images
</commit_message>
<xml_diff>
--- a/dgp.pptx
+++ b/dgp.pptx
@@ -7,6 +7,9 @@
   <p:sldIdLst>
     <p:sldId id="256" r:id="rId2"/>
     <p:sldId id="257" r:id="rId3"/>
+    <p:sldId id="260" r:id="rId4"/>
+    <p:sldId id="258" r:id="rId5"/>
+    <p:sldId id="259" r:id="rId6"/>
   </p:sldIdLst>
   <p:sldSz cx="12192000" cy="6858000"/>
   <p:notesSz cx="6858000" cy="9144000"/>
@@ -5367,6 +5370,959 @@
 </p:sld>
 </file>
 
+<file path=ppt/slides/slide3.xml><?xml version="1.0" encoding="utf-8"?>
+<p:sld xmlns:a="http://schemas.openxmlformats.org/drawingml/2006/main" xmlns:r="http://schemas.openxmlformats.org/officeDocument/2006/relationships" xmlns:p="http://schemas.openxmlformats.org/presentationml/2006/main">
+  <p:cSld>
+    <p:spTree>
+      <p:nvGrpSpPr>
+        <p:cNvPr id="1" name=""/>
+        <p:cNvGrpSpPr/>
+        <p:nvPr/>
+      </p:nvGrpSpPr>
+      <p:grpSpPr>
+        <a:xfrm>
+          <a:off x="0" y="0"/>
+          <a:ext cx="0" cy="0"/>
+          <a:chOff x="0" y="0"/>
+          <a:chExt cx="0" cy="0"/>
+        </a:xfrm>
+      </p:grpSpPr>
+      <p:grpSp>
+        <p:nvGrpSpPr>
+          <p:cNvPr id="18" name="그룹 17">
+            <a:extLst>
+              <a:ext uri="{FF2B5EF4-FFF2-40B4-BE49-F238E27FC236}">
+                <a16:creationId xmlns:a16="http://schemas.microsoft.com/office/drawing/2014/main" id="{73267F72-5E2F-E34D-9358-A2C099278221}"/>
+              </a:ext>
+            </a:extLst>
+          </p:cNvPr>
+          <p:cNvGrpSpPr/>
+          <p:nvPr/>
+        </p:nvGrpSpPr>
+        <p:grpSpPr>
+          <a:xfrm>
+            <a:off x="2745916" y="591001"/>
+            <a:ext cx="5400001" cy="3600000"/>
+            <a:chOff x="2745916" y="591001"/>
+            <a:chExt cx="5400001" cy="3600000"/>
+          </a:xfrm>
+        </p:grpSpPr>
+        <p:pic>
+          <p:nvPicPr>
+            <p:cNvPr id="8" name="그림 7" descr="방이(가) 표시된 사진&#10;&#10;자동 생성된 설명">
+              <a:extLst>
+                <a:ext uri="{FF2B5EF4-FFF2-40B4-BE49-F238E27FC236}">
+                  <a16:creationId xmlns:a16="http://schemas.microsoft.com/office/drawing/2014/main" id="{A1AF84DE-BD92-4B43-8689-C504D1216AA1}"/>
+                </a:ext>
+              </a:extLst>
+            </p:cNvPr>
+            <p:cNvPicPr>
+              <a:picLocks noChangeAspect="1"/>
+            </p:cNvPicPr>
+            <p:nvPr/>
+          </p:nvPicPr>
+          <p:blipFill>
+            <a:blip r:embed="rId2"/>
+            <a:stretch>
+              <a:fillRect/>
+            </a:stretch>
+          </p:blipFill>
+          <p:spPr>
+            <a:xfrm>
+              <a:off x="2745917" y="591001"/>
+              <a:ext cx="5400000" cy="3600000"/>
+            </a:xfrm>
+            <a:prstGeom prst="rect">
+              <a:avLst/>
+            </a:prstGeom>
+          </p:spPr>
+        </p:pic>
+        <p:sp>
+          <p:nvSpPr>
+            <p:cNvPr id="6" name="직사각형 5">
+              <a:extLst>
+                <a:ext uri="{FF2B5EF4-FFF2-40B4-BE49-F238E27FC236}">
+                  <a16:creationId xmlns:a16="http://schemas.microsoft.com/office/drawing/2014/main" id="{FEDB3766-C9B2-574C-9779-33CB0565FCA6}"/>
+                </a:ext>
+              </a:extLst>
+            </p:cNvPr>
+            <p:cNvSpPr/>
+            <p:nvPr/>
+          </p:nvSpPr>
+          <p:spPr>
+            <a:xfrm>
+              <a:off x="2745916" y="2260599"/>
+              <a:ext cx="5400001" cy="1930402"/>
+            </a:xfrm>
+            <a:prstGeom prst="rect">
+              <a:avLst/>
+            </a:prstGeom>
+            <a:solidFill>
+              <a:srgbClr val="FFFFFF">
+                <a:alpha val="80000"/>
+              </a:srgbClr>
+            </a:solidFill>
+            <a:ln>
+              <a:solidFill>
+                <a:schemeClr val="bg1"/>
+              </a:solidFill>
+            </a:ln>
+          </p:spPr>
+          <p:style>
+            <a:lnRef idx="2">
+              <a:schemeClr val="accent1">
+                <a:shade val="50000"/>
+              </a:schemeClr>
+            </a:lnRef>
+            <a:fillRef idx="1">
+              <a:schemeClr val="accent1"/>
+            </a:fillRef>
+            <a:effectRef idx="0">
+              <a:schemeClr val="accent1"/>
+            </a:effectRef>
+            <a:fontRef idx="minor">
+              <a:schemeClr val="lt1"/>
+            </a:fontRef>
+          </p:style>
+          <p:txBody>
+            <a:bodyPr rtlCol="0" anchor="ctr"/>
+            <a:lstStyle/>
+            <a:p>
+              <a:pPr algn="ctr"/>
+              <a:endParaRPr kumimoji="1" lang="ko-KR" altLang="en-US" dirty="0"/>
+            </a:p>
+          </p:txBody>
+        </p:sp>
+        <p:sp>
+          <p:nvSpPr>
+            <p:cNvPr id="15" name="TextBox 14">
+              <a:extLst>
+                <a:ext uri="{FF2B5EF4-FFF2-40B4-BE49-F238E27FC236}">
+                  <a16:creationId xmlns:a16="http://schemas.microsoft.com/office/drawing/2014/main" id="{A0BF23D2-721E-FB40-9335-D7635711BB65}"/>
+                </a:ext>
+              </a:extLst>
+            </p:cNvPr>
+            <p:cNvSpPr txBox="1"/>
+            <p:nvPr/>
+          </p:nvSpPr>
+          <p:spPr>
+            <a:xfrm>
+              <a:off x="6385063" y="2565400"/>
+              <a:ext cx="1632178" cy="400110"/>
+            </a:xfrm>
+            <a:prstGeom prst="rect">
+              <a:avLst/>
+            </a:prstGeom>
+            <a:noFill/>
+          </p:spPr>
+          <p:txBody>
+            <a:bodyPr wrap="none" rtlCol="0">
+              <a:spAutoFit/>
+            </a:bodyPr>
+            <a:lstStyle/>
+            <a:p>
+              <a:r>
+                <a:rPr kumimoji="1" lang="en-US" altLang="ko-KR" sz="2000" dirty="0">
+                  <a:latin typeface="AppleMyungjo" pitchFamily="2" charset="-127"/>
+                  <a:ea typeface="AppleMyungjo" pitchFamily="2" charset="-127"/>
+                  <a:cs typeface="KoPubWorldDotum_Pro Medium" pitchFamily="2" charset="-127"/>
+                </a:rPr>
+                <a:t>South Korea</a:t>
+              </a:r>
+              <a:endParaRPr kumimoji="1" lang="ko-KR" altLang="en-US" sz="2000" dirty="0">
+                <a:latin typeface="AppleMyungjo" pitchFamily="2" charset="-127"/>
+                <a:ea typeface="AppleMyungjo" pitchFamily="2" charset="-127"/>
+                <a:cs typeface="KoPubWorldDotum_Pro Medium" pitchFamily="2" charset="-127"/>
+              </a:endParaRPr>
+            </a:p>
+          </p:txBody>
+        </p:sp>
+        <p:sp>
+          <p:nvSpPr>
+            <p:cNvPr id="16" name="TextBox 15">
+              <a:extLst>
+                <a:ext uri="{FF2B5EF4-FFF2-40B4-BE49-F238E27FC236}">
+                  <a16:creationId xmlns:a16="http://schemas.microsoft.com/office/drawing/2014/main" id="{84AE0EC2-A1F2-DC44-A0A7-C85A320DFD78}"/>
+                </a:ext>
+              </a:extLst>
+            </p:cNvPr>
+            <p:cNvSpPr txBox="1"/>
+            <p:nvPr/>
+          </p:nvSpPr>
+          <p:spPr>
+            <a:xfrm>
+              <a:off x="4940738" y="2965510"/>
+              <a:ext cx="3076503" cy="738664"/>
+            </a:xfrm>
+            <a:prstGeom prst="rect">
+              <a:avLst/>
+            </a:prstGeom>
+            <a:noFill/>
+          </p:spPr>
+          <p:txBody>
+            <a:bodyPr wrap="square" rtlCol="0">
+              <a:spAutoFit/>
+            </a:bodyPr>
+            <a:lstStyle/>
+            <a:p>
+              <a:pPr algn="r"/>
+              <a:r>
+                <a:rPr kumimoji="1" lang="en-US" altLang="ko-KR" sz="900" dirty="0">
+                  <a:latin typeface="AppleMyungjo" pitchFamily="2" charset="-127"/>
+                  <a:ea typeface="AppleMyungjo" pitchFamily="2" charset="-127"/>
+                  <a:cs typeface="KoPubWorldDotum_Pro Medium" pitchFamily="2" charset="-127"/>
+                </a:rPr>
+                <a:t>+ (</a:t>
+              </a:r>
+              <a:r>
+                <a:rPr lang="en" altLang="ko-KR" sz="900" dirty="0">
+                  <a:latin typeface="AppleMyungjo" pitchFamily="2" charset="-127"/>
+                  <a:ea typeface="AppleMyungjo" pitchFamily="2" charset="-127"/>
+                </a:rPr>
+                <a:t>82) 70-4355-2312 </a:t>
+              </a:r>
+              <a:r>
+                <a:rPr kumimoji="1" lang="en-US" altLang="ko-KR" sz="900" dirty="0" err="1">
+                  <a:latin typeface="AppleMyungjo" pitchFamily="2" charset="-127"/>
+                  <a:ea typeface="AppleMyungjo" pitchFamily="2" charset="-127"/>
+                  <a:cs typeface="KoPubWorldDotum_Pro Medium" pitchFamily="2" charset="-127"/>
+                </a:rPr>
+                <a:t>Cel</a:t>
+              </a:r>
+              <a:r>
+                <a:rPr kumimoji="1" lang="en-US" altLang="ko-KR" sz="900" dirty="0">
+                  <a:latin typeface="AppleMyungjo" pitchFamily="2" charset="-127"/>
+                  <a:ea typeface="AppleMyungjo" pitchFamily="2" charset="-127"/>
+                  <a:cs typeface="KoPubWorldDotum_Pro Medium" pitchFamily="2" charset="-127"/>
+                </a:rPr>
+                <a:t>. + (82) 10-5043-5481</a:t>
+              </a:r>
+            </a:p>
+            <a:p>
+              <a:pPr algn="r"/>
+              <a:r>
+                <a:rPr lang="en" altLang="ko-KR" sz="1100" dirty="0">
+                  <a:latin typeface="AppleMyungjo" pitchFamily="2" charset="-127"/>
+                  <a:ea typeface="AppleMyungjo" pitchFamily="2" charset="-127"/>
+                </a:rPr>
+                <a:t>(3rd Floor </a:t>
+              </a:r>
+              <a:r>
+                <a:rPr lang="en" altLang="ko-KR" sz="1100" dirty="0" err="1">
+                  <a:latin typeface="AppleMyungjo" pitchFamily="2" charset="-127"/>
+                  <a:ea typeface="AppleMyungjo" pitchFamily="2" charset="-127"/>
+                </a:rPr>
+                <a:t>Samsungdong</a:t>
+              </a:r>
+              <a:r>
+                <a:rPr lang="en" altLang="ko-KR" sz="1100" dirty="0">
+                  <a:latin typeface="AppleMyungjo" pitchFamily="2" charset="-127"/>
+                  <a:ea typeface="AppleMyungjo" pitchFamily="2" charset="-127"/>
+                </a:rPr>
+                <a:t>, </a:t>
+              </a:r>
+              <a:r>
+                <a:rPr lang="en" altLang="ko-KR" sz="1100" dirty="0" err="1">
+                  <a:latin typeface="AppleMyungjo" pitchFamily="2" charset="-127"/>
+                  <a:ea typeface="AppleMyungjo" pitchFamily="2" charset="-127"/>
+                </a:rPr>
+                <a:t>Myunghwa</a:t>
+              </a:r>
+              <a:r>
+                <a:rPr lang="en" altLang="ko-KR" sz="1100" dirty="0">
+                  <a:latin typeface="AppleMyungjo" pitchFamily="2" charset="-127"/>
+                  <a:ea typeface="AppleMyungjo" pitchFamily="2" charset="-127"/>
+                </a:rPr>
+                <a:t> </a:t>
+              </a:r>
+              <a:r>
+                <a:rPr lang="en" altLang="ko-KR" sz="1100" dirty="0" err="1">
+                  <a:latin typeface="AppleMyungjo" pitchFamily="2" charset="-127"/>
+                  <a:ea typeface="AppleMyungjo" pitchFamily="2" charset="-127"/>
+                </a:rPr>
+                <a:t>bldg</a:t>
+              </a:r>
+              <a:r>
+                <a:rPr lang="en" altLang="ko-KR" sz="1100" dirty="0">
+                  <a:latin typeface="AppleMyungjo" pitchFamily="2" charset="-127"/>
+                  <a:ea typeface="AppleMyungjo" pitchFamily="2" charset="-127"/>
+                </a:rPr>
+                <a:t>), 11 </a:t>
+              </a:r>
+              <a:r>
+                <a:rPr lang="en" altLang="ko-KR" sz="1100" dirty="0" err="1">
+                  <a:latin typeface="AppleMyungjo" pitchFamily="2" charset="-127"/>
+                  <a:ea typeface="AppleMyungjo" pitchFamily="2" charset="-127"/>
+                </a:rPr>
+                <a:t>Bongeunsaro</a:t>
+              </a:r>
+              <a:r>
+                <a:rPr lang="en" altLang="ko-KR" sz="1100" dirty="0">
+                  <a:latin typeface="AppleMyungjo" pitchFamily="2" charset="-127"/>
+                  <a:ea typeface="AppleMyungjo" pitchFamily="2" charset="-127"/>
+                </a:rPr>
+                <a:t> 63 Gil, Gangnam-Gu, Seoul, 06097, </a:t>
+              </a:r>
+              <a:r>
+                <a:rPr lang="en" altLang="ko-KR" sz="1100" dirty="0" err="1">
+                  <a:latin typeface="AppleMyungjo" pitchFamily="2" charset="-127"/>
+                  <a:ea typeface="AppleMyungjo" pitchFamily="2" charset="-127"/>
+                </a:rPr>
+                <a:t>Repubic</a:t>
+              </a:r>
+              <a:r>
+                <a:rPr lang="en" altLang="ko-KR" sz="1100" dirty="0">
+                  <a:latin typeface="AppleMyungjo" pitchFamily="2" charset="-127"/>
+                  <a:ea typeface="AppleMyungjo" pitchFamily="2" charset="-127"/>
+                </a:rPr>
+                <a:t> of Korea</a:t>
+              </a:r>
+            </a:p>
+          </p:txBody>
+        </p:sp>
+        <p:pic>
+          <p:nvPicPr>
+            <p:cNvPr id="13" name="그림 12" descr="그리기이(가) 표시된 사진&#10;&#10;자동 생성된 설명">
+              <a:extLst>
+                <a:ext uri="{FF2B5EF4-FFF2-40B4-BE49-F238E27FC236}">
+                  <a16:creationId xmlns:a16="http://schemas.microsoft.com/office/drawing/2014/main" id="{D7A1CBBC-B85E-2C46-9836-6F7794C13556}"/>
+                </a:ext>
+              </a:extLst>
+            </p:cNvPr>
+            <p:cNvPicPr>
+              <a:picLocks noChangeAspect="1"/>
+            </p:cNvPicPr>
+            <p:nvPr/>
+          </p:nvPicPr>
+          <p:blipFill>
+            <a:blip r:embed="rId3"/>
+            <a:stretch>
+              <a:fillRect/>
+            </a:stretch>
+          </p:blipFill>
+          <p:spPr>
+            <a:xfrm>
+              <a:off x="2909700" y="3045800"/>
+              <a:ext cx="1987589" cy="383200"/>
+            </a:xfrm>
+            <a:prstGeom prst="rect">
+              <a:avLst/>
+            </a:prstGeom>
+          </p:spPr>
+        </p:pic>
+      </p:grpSp>
+    </p:spTree>
+    <p:extLst>
+      <p:ext uri="{BB962C8B-B14F-4D97-AF65-F5344CB8AC3E}">
+        <p14:creationId xmlns:p14="http://schemas.microsoft.com/office/powerpoint/2010/main" val="1570863730"/>
+      </p:ext>
+    </p:extLst>
+  </p:cSld>
+  <p:clrMapOvr>
+    <a:masterClrMapping/>
+  </p:clrMapOvr>
+</p:sld>
+</file>
+
+<file path=ppt/slides/slide4.xml><?xml version="1.0" encoding="utf-8"?>
+<p:sld xmlns:a="http://schemas.openxmlformats.org/drawingml/2006/main" xmlns:r="http://schemas.openxmlformats.org/officeDocument/2006/relationships" xmlns:p="http://schemas.openxmlformats.org/presentationml/2006/main">
+  <p:cSld>
+    <p:spTree>
+      <p:nvGrpSpPr>
+        <p:cNvPr id="1" name=""/>
+        <p:cNvGrpSpPr/>
+        <p:nvPr/>
+      </p:nvGrpSpPr>
+      <p:grpSpPr>
+        <a:xfrm>
+          <a:off x="0" y="0"/>
+          <a:ext cx="0" cy="0"/>
+          <a:chOff x="0" y="0"/>
+          <a:chExt cx="0" cy="0"/>
+        </a:xfrm>
+      </p:grpSpPr>
+      <p:grpSp>
+        <p:nvGrpSpPr>
+          <p:cNvPr id="17" name="그룹 16">
+            <a:extLst>
+              <a:ext uri="{FF2B5EF4-FFF2-40B4-BE49-F238E27FC236}">
+                <a16:creationId xmlns:a16="http://schemas.microsoft.com/office/drawing/2014/main" id="{E8658935-D656-4E49-B2F5-B19E5FB4C0A1}"/>
+              </a:ext>
+            </a:extLst>
+          </p:cNvPr>
+          <p:cNvGrpSpPr/>
+          <p:nvPr/>
+        </p:nvGrpSpPr>
+        <p:grpSpPr>
+          <a:xfrm>
+            <a:off x="2745916" y="591001"/>
+            <a:ext cx="5400001" cy="3600000"/>
+            <a:chOff x="2745916" y="591001"/>
+            <a:chExt cx="5400001" cy="3600000"/>
+          </a:xfrm>
+        </p:grpSpPr>
+        <p:pic>
+          <p:nvPicPr>
+            <p:cNvPr id="14" name="그림 13" descr="조류이(가) 표시된 사진&#10;&#10;자동 생성된 설명">
+              <a:extLst>
+                <a:ext uri="{FF2B5EF4-FFF2-40B4-BE49-F238E27FC236}">
+                  <a16:creationId xmlns:a16="http://schemas.microsoft.com/office/drawing/2014/main" id="{F9A2B801-0FCE-2446-A9AD-9268BC175CBF}"/>
+                </a:ext>
+              </a:extLst>
+            </p:cNvPr>
+            <p:cNvPicPr>
+              <a:picLocks/>
+            </p:cNvPicPr>
+            <p:nvPr/>
+          </p:nvPicPr>
+          <p:blipFill>
+            <a:blip r:embed="rId2"/>
+            <a:stretch>
+              <a:fillRect/>
+            </a:stretch>
+          </p:blipFill>
+          <p:spPr>
+            <a:xfrm>
+              <a:off x="2745917" y="591001"/>
+              <a:ext cx="5400000" cy="3600000"/>
+            </a:xfrm>
+            <a:prstGeom prst="rect">
+              <a:avLst/>
+            </a:prstGeom>
+          </p:spPr>
+        </p:pic>
+        <p:sp>
+          <p:nvSpPr>
+            <p:cNvPr id="6" name="직사각형 5">
+              <a:extLst>
+                <a:ext uri="{FF2B5EF4-FFF2-40B4-BE49-F238E27FC236}">
+                  <a16:creationId xmlns:a16="http://schemas.microsoft.com/office/drawing/2014/main" id="{FEDB3766-C9B2-574C-9779-33CB0565FCA6}"/>
+                </a:ext>
+              </a:extLst>
+            </p:cNvPr>
+            <p:cNvSpPr/>
+            <p:nvPr/>
+          </p:nvSpPr>
+          <p:spPr>
+            <a:xfrm>
+              <a:off x="2745916" y="2260599"/>
+              <a:ext cx="5400001" cy="1930402"/>
+            </a:xfrm>
+            <a:prstGeom prst="rect">
+              <a:avLst/>
+            </a:prstGeom>
+            <a:solidFill>
+              <a:srgbClr val="FFFFFF">
+                <a:alpha val="60000"/>
+              </a:srgbClr>
+            </a:solidFill>
+            <a:ln>
+              <a:solidFill>
+                <a:schemeClr val="bg1"/>
+              </a:solidFill>
+            </a:ln>
+          </p:spPr>
+          <p:style>
+            <a:lnRef idx="2">
+              <a:schemeClr val="accent1">
+                <a:shade val="50000"/>
+              </a:schemeClr>
+            </a:lnRef>
+            <a:fillRef idx="1">
+              <a:schemeClr val="accent1"/>
+            </a:fillRef>
+            <a:effectRef idx="0">
+              <a:schemeClr val="accent1"/>
+            </a:effectRef>
+            <a:fontRef idx="minor">
+              <a:schemeClr val="lt1"/>
+            </a:fontRef>
+          </p:style>
+          <p:txBody>
+            <a:bodyPr rtlCol="0" anchor="ctr"/>
+            <a:lstStyle/>
+            <a:p>
+              <a:pPr algn="ctr"/>
+              <a:endParaRPr kumimoji="1" lang="ko-KR" altLang="en-US" dirty="0"/>
+            </a:p>
+          </p:txBody>
+        </p:sp>
+        <p:pic>
+          <p:nvPicPr>
+            <p:cNvPr id="12" name="그림 11" descr="노란색, 그리기, 하얀색이(가) 표시된 사진&#10;&#10;자동 생성된 설명">
+              <a:extLst>
+                <a:ext uri="{FF2B5EF4-FFF2-40B4-BE49-F238E27FC236}">
+                  <a16:creationId xmlns:a16="http://schemas.microsoft.com/office/drawing/2014/main" id="{775E8100-EF2C-6B47-9A1E-0A6F6275AC6F}"/>
+                </a:ext>
+              </a:extLst>
+            </p:cNvPr>
+            <p:cNvPicPr>
+              <a:picLocks noChangeAspect="1"/>
+            </p:cNvPicPr>
+            <p:nvPr/>
+          </p:nvPicPr>
+          <p:blipFill>
+            <a:blip r:embed="rId3"/>
+            <a:stretch>
+              <a:fillRect/>
+            </a:stretch>
+          </p:blipFill>
+          <p:spPr>
+            <a:xfrm>
+              <a:off x="3264338" y="2565400"/>
+              <a:ext cx="1676400" cy="1320800"/>
+            </a:xfrm>
+            <a:prstGeom prst="rect">
+              <a:avLst/>
+            </a:prstGeom>
+          </p:spPr>
+        </p:pic>
+        <p:sp>
+          <p:nvSpPr>
+            <p:cNvPr id="15" name="TextBox 14">
+              <a:extLst>
+                <a:ext uri="{FF2B5EF4-FFF2-40B4-BE49-F238E27FC236}">
+                  <a16:creationId xmlns:a16="http://schemas.microsoft.com/office/drawing/2014/main" id="{A0BF23D2-721E-FB40-9335-D7635711BB65}"/>
+                </a:ext>
+              </a:extLst>
+            </p:cNvPr>
+            <p:cNvSpPr txBox="1"/>
+            <p:nvPr/>
+          </p:nvSpPr>
+          <p:spPr>
+            <a:xfrm>
+              <a:off x="6574636" y="2565400"/>
+              <a:ext cx="1455848" cy="400110"/>
+            </a:xfrm>
+            <a:prstGeom prst="rect">
+              <a:avLst/>
+            </a:prstGeom>
+            <a:noFill/>
+          </p:spPr>
+          <p:txBody>
+            <a:bodyPr wrap="none" rtlCol="0">
+              <a:spAutoFit/>
+            </a:bodyPr>
+            <a:lstStyle/>
+            <a:p>
+              <a:r>
+                <a:rPr kumimoji="1" lang="en-US" altLang="ko-KR" sz="2000" dirty="0">
+                  <a:latin typeface="AppleMyungjo" pitchFamily="2" charset="-127"/>
+                  <a:ea typeface="AppleMyungjo" pitchFamily="2" charset="-127"/>
+                  <a:cs typeface="KoPubWorldDotum_Pro Medium" pitchFamily="2" charset="-127"/>
+                </a:rPr>
+                <a:t>Nicaragua </a:t>
+              </a:r>
+              <a:endParaRPr kumimoji="1" lang="ko-KR" altLang="en-US" sz="2000" dirty="0">
+                <a:latin typeface="AppleMyungjo" pitchFamily="2" charset="-127"/>
+                <a:ea typeface="AppleMyungjo" pitchFamily="2" charset="-127"/>
+                <a:cs typeface="KoPubWorldDotum_Pro Medium" pitchFamily="2" charset="-127"/>
+              </a:endParaRPr>
+            </a:p>
+          </p:txBody>
+        </p:sp>
+        <p:sp>
+          <p:nvSpPr>
+            <p:cNvPr id="16" name="TextBox 15">
+              <a:extLst>
+                <a:ext uri="{FF2B5EF4-FFF2-40B4-BE49-F238E27FC236}">
+                  <a16:creationId xmlns:a16="http://schemas.microsoft.com/office/drawing/2014/main" id="{84AE0EC2-A1F2-DC44-A0A7-C85A320DFD78}"/>
+                </a:ext>
+              </a:extLst>
+            </p:cNvPr>
+            <p:cNvSpPr txBox="1"/>
+            <p:nvPr/>
+          </p:nvSpPr>
+          <p:spPr>
+            <a:xfrm>
+              <a:off x="4940738" y="2965510"/>
+              <a:ext cx="3076503" cy="738664"/>
+            </a:xfrm>
+            <a:prstGeom prst="rect">
+              <a:avLst/>
+            </a:prstGeom>
+            <a:noFill/>
+          </p:spPr>
+          <p:txBody>
+            <a:bodyPr wrap="square" rtlCol="0">
+              <a:spAutoFit/>
+            </a:bodyPr>
+            <a:lstStyle/>
+            <a:p>
+              <a:pPr algn="r"/>
+              <a:r>
+                <a:rPr kumimoji="1" lang="en-US" altLang="ko-KR" sz="900" dirty="0">
+                  <a:latin typeface="AppleMyungjo" pitchFamily="2" charset="-127"/>
+                  <a:ea typeface="AppleMyungjo" pitchFamily="2" charset="-127"/>
+                  <a:cs typeface="KoPubWorldDotum_Pro Medium" pitchFamily="2" charset="-127"/>
+                </a:rPr>
+                <a:t>+ (505) 2231-3474    </a:t>
+              </a:r>
+              <a:r>
+                <a:rPr kumimoji="1" lang="en-US" altLang="ko-KR" sz="900" dirty="0" err="1">
+                  <a:latin typeface="AppleMyungjo" pitchFamily="2" charset="-127"/>
+                  <a:ea typeface="AppleMyungjo" pitchFamily="2" charset="-127"/>
+                  <a:cs typeface="KoPubWorldDotum_Pro Medium" pitchFamily="2" charset="-127"/>
+                </a:rPr>
+                <a:t>Cel</a:t>
+              </a:r>
+              <a:r>
+                <a:rPr kumimoji="1" lang="en-US" altLang="ko-KR" sz="900" dirty="0">
+                  <a:latin typeface="AppleMyungjo" pitchFamily="2" charset="-127"/>
+                  <a:ea typeface="AppleMyungjo" pitchFamily="2" charset="-127"/>
+                  <a:cs typeface="KoPubWorldDotum_Pro Medium" pitchFamily="2" charset="-127"/>
+                </a:rPr>
+                <a:t>. + (505) 8932-7094</a:t>
+              </a:r>
+            </a:p>
+            <a:p>
+              <a:pPr algn="r"/>
+              <a:r>
+                <a:rPr kumimoji="1" lang="en-US" altLang="ko-KR" sz="1100" dirty="0" err="1">
+                  <a:latin typeface="AppleMyungjo" pitchFamily="2" charset="-127"/>
+                  <a:ea typeface="AppleMyungjo" pitchFamily="2" charset="-127"/>
+                  <a:cs typeface="KoPubWorldDotum_Pro Medium" pitchFamily="2" charset="-127"/>
+                </a:rPr>
+                <a:t>Reparto</a:t>
+              </a:r>
+              <a:r>
+                <a:rPr kumimoji="1" lang="en-US" altLang="ko-KR" sz="1100" dirty="0">
+                  <a:latin typeface="AppleMyungjo" pitchFamily="2" charset="-127"/>
+                  <a:ea typeface="AppleMyungjo" pitchFamily="2" charset="-127"/>
+                  <a:cs typeface="KoPubWorldDotum_Pro Medium" pitchFamily="2" charset="-127"/>
+                </a:rPr>
+                <a:t> </a:t>
+              </a:r>
+              <a:r>
+                <a:rPr kumimoji="1" lang="en-US" altLang="ko-KR" sz="1100" dirty="0" err="1">
+                  <a:latin typeface="AppleMyungjo" pitchFamily="2" charset="-127"/>
+                  <a:ea typeface="AppleMyungjo" pitchFamily="2" charset="-127"/>
+                  <a:cs typeface="KoPubWorldDotum_Pro Medium" pitchFamily="2" charset="-127"/>
+                </a:rPr>
+                <a:t>Puntaldía</a:t>
+              </a:r>
+              <a:r>
+                <a:rPr kumimoji="1" lang="en-US" altLang="ko-KR" sz="1100" dirty="0">
+                  <a:latin typeface="AppleMyungjo" pitchFamily="2" charset="-127"/>
+                  <a:ea typeface="AppleMyungjo" pitchFamily="2" charset="-127"/>
+                  <a:cs typeface="KoPubWorldDotum_Pro Medium" pitchFamily="2" charset="-127"/>
+                </a:rPr>
+                <a:t>, de la entrada principal 1c. Norte, 1c. Abajo, 75vrs al Sur, casa #15. Managua, Nicaragua</a:t>
+              </a:r>
+              <a:endParaRPr kumimoji="1" lang="ko-KR" altLang="en-US" sz="1100" dirty="0">
+                <a:latin typeface="AppleMyungjo" pitchFamily="2" charset="-127"/>
+                <a:ea typeface="AppleMyungjo" pitchFamily="2" charset="-127"/>
+                <a:cs typeface="KoPubWorldDotum_Pro Medium" pitchFamily="2" charset="-127"/>
+              </a:endParaRPr>
+            </a:p>
+          </p:txBody>
+        </p:sp>
+      </p:grpSp>
+    </p:spTree>
+    <p:extLst>
+      <p:ext uri="{BB962C8B-B14F-4D97-AF65-F5344CB8AC3E}">
+        <p14:creationId xmlns:p14="http://schemas.microsoft.com/office/powerpoint/2010/main" val="3874307897"/>
+      </p:ext>
+    </p:extLst>
+  </p:cSld>
+  <p:clrMapOvr>
+    <a:masterClrMapping/>
+  </p:clrMapOvr>
+</p:sld>
+</file>
+
+<file path=ppt/slides/slide5.xml><?xml version="1.0" encoding="utf-8"?>
+<p:sld xmlns:a="http://schemas.openxmlformats.org/drawingml/2006/main" xmlns:r="http://schemas.openxmlformats.org/officeDocument/2006/relationships" xmlns:p="http://schemas.openxmlformats.org/presentationml/2006/main">
+  <p:cSld>
+    <p:spTree>
+      <p:nvGrpSpPr>
+        <p:cNvPr id="1" name=""/>
+        <p:cNvGrpSpPr/>
+        <p:nvPr/>
+      </p:nvGrpSpPr>
+      <p:grpSpPr>
+        <a:xfrm>
+          <a:off x="0" y="0"/>
+          <a:ext cx="0" cy="0"/>
+          <a:chOff x="0" y="0"/>
+          <a:chExt cx="0" cy="0"/>
+        </a:xfrm>
+      </p:grpSpPr>
+      <p:grpSp>
+        <p:nvGrpSpPr>
+          <p:cNvPr id="4" name="그룹 3">
+            <a:extLst>
+              <a:ext uri="{FF2B5EF4-FFF2-40B4-BE49-F238E27FC236}">
+                <a16:creationId xmlns:a16="http://schemas.microsoft.com/office/drawing/2014/main" id="{9E42A3C5-40B1-F84F-96EF-55401DC1AA60}"/>
+              </a:ext>
+            </a:extLst>
+          </p:cNvPr>
+          <p:cNvGrpSpPr/>
+          <p:nvPr/>
+        </p:nvGrpSpPr>
+        <p:grpSpPr>
+          <a:xfrm>
+            <a:off x="2737717" y="593251"/>
+            <a:ext cx="5408199" cy="3597750"/>
+            <a:chOff x="2737717" y="593251"/>
+            <a:chExt cx="5408199" cy="3597750"/>
+          </a:xfrm>
+        </p:grpSpPr>
+        <p:pic>
+          <p:nvPicPr>
+            <p:cNvPr id="3" name="그림 2" descr="그리기이(가) 표시된 사진&#10;&#10;자동 생성된 설명">
+              <a:extLst>
+                <a:ext uri="{FF2B5EF4-FFF2-40B4-BE49-F238E27FC236}">
+                  <a16:creationId xmlns:a16="http://schemas.microsoft.com/office/drawing/2014/main" id="{F4A90744-F9F4-B943-8CBC-AA0980524849}"/>
+                </a:ext>
+              </a:extLst>
+            </p:cNvPr>
+            <p:cNvPicPr>
+              <a:picLocks noChangeAspect="1"/>
+            </p:cNvPicPr>
+            <p:nvPr/>
+          </p:nvPicPr>
+          <p:blipFill>
+            <a:blip r:embed="rId2"/>
+            <a:stretch>
+              <a:fillRect/>
+            </a:stretch>
+          </p:blipFill>
+          <p:spPr>
+            <a:xfrm>
+              <a:off x="2737717" y="593251"/>
+              <a:ext cx="5400000" cy="3597750"/>
+            </a:xfrm>
+            <a:prstGeom prst="rect">
+              <a:avLst/>
+            </a:prstGeom>
+          </p:spPr>
+        </p:pic>
+        <p:sp>
+          <p:nvSpPr>
+            <p:cNvPr id="7" name="직사각형 6">
+              <a:extLst>
+                <a:ext uri="{FF2B5EF4-FFF2-40B4-BE49-F238E27FC236}">
+                  <a16:creationId xmlns:a16="http://schemas.microsoft.com/office/drawing/2014/main" id="{742BE67D-AD3B-0D42-A3D6-FE30148EE5C8}"/>
+                </a:ext>
+              </a:extLst>
+            </p:cNvPr>
+            <p:cNvSpPr/>
+            <p:nvPr/>
+          </p:nvSpPr>
+          <p:spPr>
+            <a:xfrm>
+              <a:off x="2745915" y="2260599"/>
+              <a:ext cx="5400001" cy="1930402"/>
+            </a:xfrm>
+            <a:prstGeom prst="rect">
+              <a:avLst/>
+            </a:prstGeom>
+            <a:solidFill>
+              <a:srgbClr val="FFFFFF">
+                <a:alpha val="60000"/>
+              </a:srgbClr>
+            </a:solidFill>
+            <a:ln>
+              <a:solidFill>
+                <a:schemeClr val="bg1"/>
+              </a:solidFill>
+            </a:ln>
+          </p:spPr>
+          <p:style>
+            <a:lnRef idx="2">
+              <a:schemeClr val="accent1">
+                <a:shade val="50000"/>
+              </a:schemeClr>
+            </a:lnRef>
+            <a:fillRef idx="1">
+              <a:schemeClr val="accent1"/>
+            </a:fillRef>
+            <a:effectRef idx="0">
+              <a:schemeClr val="accent1"/>
+            </a:effectRef>
+            <a:fontRef idx="minor">
+              <a:schemeClr val="lt1"/>
+            </a:fontRef>
+          </p:style>
+          <p:txBody>
+            <a:bodyPr rtlCol="0" anchor="ctr"/>
+            <a:lstStyle/>
+            <a:p>
+              <a:pPr algn="ctr"/>
+              <a:endParaRPr kumimoji="1" lang="ko-KR" altLang="en-US" dirty="0"/>
+            </a:p>
+          </p:txBody>
+        </p:sp>
+        <p:sp>
+          <p:nvSpPr>
+            <p:cNvPr id="11" name="TextBox 10">
+              <a:extLst>
+                <a:ext uri="{FF2B5EF4-FFF2-40B4-BE49-F238E27FC236}">
+                  <a16:creationId xmlns:a16="http://schemas.microsoft.com/office/drawing/2014/main" id="{D53A75AD-1E56-6842-B552-48591D4F2EC8}"/>
+                </a:ext>
+              </a:extLst>
+            </p:cNvPr>
+            <p:cNvSpPr txBox="1"/>
+            <p:nvPr/>
+          </p:nvSpPr>
+          <p:spPr>
+            <a:xfrm>
+              <a:off x="7002519" y="2594065"/>
+              <a:ext cx="947695" cy="400110"/>
+            </a:xfrm>
+            <a:prstGeom prst="rect">
+              <a:avLst/>
+            </a:prstGeom>
+            <a:noFill/>
+          </p:spPr>
+          <p:txBody>
+            <a:bodyPr wrap="none" rtlCol="0">
+              <a:spAutoFit/>
+            </a:bodyPr>
+            <a:lstStyle/>
+            <a:p>
+              <a:r>
+                <a:rPr kumimoji="1" lang="en-US" altLang="ko-KR" sz="2000" dirty="0">
+                  <a:latin typeface="AppleMyungjo" pitchFamily="2" charset="-127"/>
+                  <a:ea typeface="AppleMyungjo" pitchFamily="2" charset="-127"/>
+                  <a:cs typeface="KoPubWorldDotum_Pro Medium" pitchFamily="2" charset="-127"/>
+                </a:rPr>
+                <a:t>Ghana</a:t>
+              </a:r>
+              <a:endParaRPr kumimoji="1" lang="ko-KR" altLang="en-US" sz="2000" dirty="0">
+                <a:latin typeface="AppleMyungjo" pitchFamily="2" charset="-127"/>
+                <a:ea typeface="AppleMyungjo" pitchFamily="2" charset="-127"/>
+                <a:cs typeface="KoPubWorldDotum_Pro Medium" pitchFamily="2" charset="-127"/>
+              </a:endParaRPr>
+            </a:p>
+          </p:txBody>
+        </p:sp>
+        <p:sp>
+          <p:nvSpPr>
+            <p:cNvPr id="14" name="TextBox 13">
+              <a:extLst>
+                <a:ext uri="{FF2B5EF4-FFF2-40B4-BE49-F238E27FC236}">
+                  <a16:creationId xmlns:a16="http://schemas.microsoft.com/office/drawing/2014/main" id="{9220E03F-A97E-484C-B7A8-CDE4F9CF76F2}"/>
+                </a:ext>
+              </a:extLst>
+            </p:cNvPr>
+            <p:cNvSpPr txBox="1"/>
+            <p:nvPr/>
+          </p:nvSpPr>
+          <p:spPr>
+            <a:xfrm>
+              <a:off x="4940738" y="2965510"/>
+              <a:ext cx="3076503" cy="430887"/>
+            </a:xfrm>
+            <a:prstGeom prst="rect">
+              <a:avLst/>
+            </a:prstGeom>
+            <a:noFill/>
+          </p:spPr>
+          <p:txBody>
+            <a:bodyPr wrap="square" rtlCol="0">
+              <a:spAutoFit/>
+            </a:bodyPr>
+            <a:lstStyle/>
+            <a:p>
+              <a:pPr algn="r"/>
+              <a:r>
+                <a:rPr lang="en-US" altLang="ko-KR" sz="1100" b="1" dirty="0">
+                  <a:latin typeface="AppleMyungjo" pitchFamily="2" charset="-127"/>
+                  <a:ea typeface="AppleMyungjo" pitchFamily="2" charset="-127"/>
+                </a:rPr>
+                <a:t>M. </a:t>
+              </a:r>
+              <a:r>
+                <a:rPr lang="en-US" altLang="ko-KR" sz="1100" dirty="0">
+                  <a:latin typeface="AppleMyungjo" pitchFamily="2" charset="-127"/>
+                  <a:ea typeface="AppleMyungjo" pitchFamily="2" charset="-127"/>
+                </a:rPr>
+                <a:t>054 490 7653</a:t>
+              </a:r>
+            </a:p>
+            <a:p>
+              <a:pPr algn="r"/>
+              <a:r>
+                <a:rPr lang="en-US" altLang="ko-KR" sz="1100" dirty="0">
+                  <a:latin typeface="AppleMyungjo" pitchFamily="2" charset="-127"/>
+                  <a:ea typeface="AppleMyungjo" pitchFamily="2" charset="-127"/>
+                </a:rPr>
+                <a:t>P.O. Box, TE 12098, </a:t>
+              </a:r>
+              <a:r>
+                <a:rPr lang="en-US" altLang="ko-KR" sz="1100" dirty="0" err="1">
+                  <a:latin typeface="AppleMyungjo" pitchFamily="2" charset="-127"/>
+                  <a:ea typeface="AppleMyungjo" pitchFamily="2" charset="-127"/>
+                </a:rPr>
+                <a:t>Tema</a:t>
+              </a:r>
+              <a:r>
+                <a:rPr lang="en-US" altLang="ko-KR" sz="1100" dirty="0">
+                  <a:latin typeface="AppleMyungjo" pitchFamily="2" charset="-127"/>
+                  <a:ea typeface="AppleMyungjo" pitchFamily="2" charset="-127"/>
+                </a:rPr>
+                <a:t>, Ghana</a:t>
+              </a:r>
+              <a:endParaRPr kumimoji="1" lang="ko-KR" altLang="en-US" sz="1100" dirty="0">
+                <a:latin typeface="AppleMyungjo" pitchFamily="2" charset="-127"/>
+                <a:ea typeface="AppleMyungjo" pitchFamily="2" charset="-127"/>
+                <a:cs typeface="KoPubWorldDotum_Pro Medium" pitchFamily="2" charset="-127"/>
+              </a:endParaRPr>
+            </a:p>
+          </p:txBody>
+        </p:sp>
+        <p:pic>
+          <p:nvPicPr>
+            <p:cNvPr id="15" name="그림 14">
+              <a:extLst>
+                <a:ext uri="{FF2B5EF4-FFF2-40B4-BE49-F238E27FC236}">
+                  <a16:creationId xmlns:a16="http://schemas.microsoft.com/office/drawing/2014/main" id="{C69B3C77-5933-0F44-BE70-87912447B6D1}"/>
+                </a:ext>
+              </a:extLst>
+            </p:cNvPr>
+            <p:cNvPicPr>
+              <a:picLocks noChangeAspect="1"/>
+            </p:cNvPicPr>
+            <p:nvPr/>
+          </p:nvPicPr>
+          <p:blipFill>
+            <a:blip r:embed="rId3">
+              <a:extLst>
+                <a:ext uri="{28A0092B-C50C-407E-A947-70E740481C1C}">
+                  <a14:useLocalDpi xmlns:a14="http://schemas.microsoft.com/office/drawing/2010/main" val="0"/>
+                </a:ext>
+              </a:extLst>
+            </a:blip>
+            <a:stretch>
+              <a:fillRect/>
+            </a:stretch>
+          </p:blipFill>
+          <p:spPr>
+            <a:xfrm>
+              <a:off x="2938354" y="2786426"/>
+              <a:ext cx="2704181" cy="712305"/>
+            </a:xfrm>
+            <a:prstGeom prst="rect">
+              <a:avLst/>
+            </a:prstGeom>
+          </p:spPr>
+        </p:pic>
+      </p:grpSp>
+    </p:spTree>
+    <p:extLst>
+      <p:ext uri="{BB962C8B-B14F-4D97-AF65-F5344CB8AC3E}">
+        <p14:creationId xmlns:p14="http://schemas.microsoft.com/office/powerpoint/2010/main" val="2084238294"/>
+      </p:ext>
+    </p:extLst>
+  </p:cSld>
+  <p:clrMapOvr>
+    <a:masterClrMapping/>
+  </p:clrMapOvr>
+</p:sld>
+</file>
+
 <file path=ppt/theme/theme1.xml><?xml version="1.0" encoding="utf-8"?>
 <a:theme xmlns:a="http://schemas.openxmlformats.org/drawingml/2006/main" name="Office 테마">
   <a:themeElements>

</xml_diff>

<commit_message>
change structure name & add history
</commit_message>
<xml_diff>
--- a/dgp.pptx
+++ b/dgp.pptx
@@ -4095,7 +4095,7 @@
                 </a:solidFill>
                 <a:latin typeface="+mj-lt"/>
               </a:rPr>
-              <a:t>김동찬</a:t>
+              <a:t>최성묵</a:t>
             </a:r>
           </a:p>
         </p:txBody>
@@ -4828,7 +4828,22 @@
                 </a:solidFill>
                 <a:latin typeface="+mj-lt"/>
               </a:rPr>
-              <a:t>Kim SonnChol, Oh Seung Hyun</a:t>
+              <a:t>Kim SonnChol</a:t>
+            </a:r>
+          </a:p>
+          <a:p>
+            <a:pPr algn="ctr"/>
+            <a:r>
+              <a:rPr kumimoji="1" lang="en-US" altLang="ko-KR" sz="1000" dirty="0">
+                <a:solidFill>
+                  <a:schemeClr val="tx1">
+                    <a:lumMod val="75000"/>
+                    <a:lumOff val="25000"/>
+                  </a:schemeClr>
+                </a:solidFill>
+                <a:latin typeface="+mj-lt"/>
+              </a:rPr>
+              <a:t>Oh SeungHyun</a:t>
             </a:r>
             <a:endParaRPr kumimoji="1" lang="ko-KR" altLang="en-US" sz="1000" dirty="0">
               <a:solidFill>
@@ -4976,7 +4991,7 @@
                 </a:solidFill>
                 <a:latin typeface="+mj-lt"/>
               </a:rPr>
-              <a:t>Joseph</a:t>
+              <a:t>Cho Joseph</a:t>
             </a:r>
             <a:endParaRPr kumimoji="1" lang="ko-KR" altLang="en-US" sz="1000" dirty="0">
               <a:solidFill>
@@ -5122,9 +5137,20 @@
                     <a:lumOff val="25000"/>
                   </a:schemeClr>
                 </a:solidFill>
+              </a:rPr>
+              <a:t>Choi </a:t>
+            </a:r>
+            <a:r>
+              <a:rPr kumimoji="1" lang="en-US" altLang="ko-KR" sz="1000" dirty="0">
+                <a:solidFill>
+                  <a:schemeClr val="tx1">
+                    <a:lumMod val="75000"/>
+                    <a:lumOff val="25000"/>
+                  </a:schemeClr>
+                </a:solidFill>
                 <a:latin typeface="+mj-lt"/>
               </a:rPr>
-              <a:t>Kim DongChan</a:t>
+              <a:t>SeongMook</a:t>
             </a:r>
             <a:endParaRPr kumimoji="1" lang="ko-KR" altLang="en-US" sz="1000" dirty="0">
               <a:solidFill>

</xml_diff>